<commit_message>
cleaned 6 and 7
</commit_message>
<xml_diff>
--- a/Module 7 -- merge/Module 7 merge.pptx
+++ b/Module 7 -- merge/Module 7 merge.pptx
@@ -611,7 +611,7 @@
           <a:bodyPr/>
           <a:lstStyle/>
           <a:p>
-            <a:fld id="{49788B37-C21A-5B49-AA3A-FF17C8E3A1E5}" type="datetimeFigureOut">
+            <a:fld id="{2F8F08F5-B6A5-4D4B-A599-90947C01A5A7}" type="datetime1">
               <a:rPr lang="en-US" smtClean="0"/>
               <a:t>5/3/2017</a:t>
             </a:fld>
@@ -634,6 +634,10 @@
           <a:bodyPr/>
           <a:lstStyle/>
           <a:p>
+            <a:r>
+              <a:rPr lang="en-US" smtClean="0"/>
+              <a:t>Michele Samorani - Data Science Analysis with Python</a:t>
+            </a:r>
             <a:endParaRPr lang="en-US"/>
           </a:p>
         </p:txBody>
@@ -781,7 +785,7 @@
           <a:bodyPr/>
           <a:lstStyle/>
           <a:p>
-            <a:fld id="{49788B37-C21A-5B49-AA3A-FF17C8E3A1E5}" type="datetimeFigureOut">
+            <a:fld id="{BF0FCDF5-91FC-42CF-B71B-70F6D9E2D19B}" type="datetime1">
               <a:rPr lang="en-US" smtClean="0"/>
               <a:t>5/3/2017</a:t>
             </a:fld>
@@ -804,6 +808,10 @@
           <a:bodyPr/>
           <a:lstStyle/>
           <a:p>
+            <a:r>
+              <a:rPr lang="en-US" smtClean="0"/>
+              <a:t>Michele Samorani - Data Science Analysis with Python</a:t>
+            </a:r>
             <a:endParaRPr lang="en-US"/>
           </a:p>
         </p:txBody>
@@ -961,7 +969,7 @@
           <a:bodyPr/>
           <a:lstStyle/>
           <a:p>
-            <a:fld id="{49788B37-C21A-5B49-AA3A-FF17C8E3A1E5}" type="datetimeFigureOut">
+            <a:fld id="{A65EDDA0-548D-41D3-A5F6-4470D2C8B691}" type="datetime1">
               <a:rPr lang="en-US" smtClean="0"/>
               <a:t>5/3/2017</a:t>
             </a:fld>
@@ -984,6 +992,10 @@
           <a:bodyPr/>
           <a:lstStyle/>
           <a:p>
+            <a:r>
+              <a:rPr lang="en-US" smtClean="0"/>
+              <a:t>Michele Samorani - Data Science Analysis with Python</a:t>
+            </a:r>
             <a:endParaRPr lang="en-US"/>
           </a:p>
         </p:txBody>
@@ -1131,7 +1143,7 @@
           <a:bodyPr/>
           <a:lstStyle/>
           <a:p>
-            <a:fld id="{49788B37-C21A-5B49-AA3A-FF17C8E3A1E5}" type="datetimeFigureOut">
+            <a:fld id="{8873D75E-3403-47D1-B559-2276D7B94D20}" type="datetime1">
               <a:rPr lang="en-US" smtClean="0"/>
               <a:t>5/3/2017</a:t>
             </a:fld>
@@ -1154,6 +1166,10 @@
           <a:bodyPr/>
           <a:lstStyle/>
           <a:p>
+            <a:r>
+              <a:rPr lang="en-US" smtClean="0"/>
+              <a:t>Michele Samorani - Data Science Analysis with Python</a:t>
+            </a:r>
             <a:endParaRPr lang="en-US"/>
           </a:p>
         </p:txBody>
@@ -1377,7 +1393,7 @@
           <a:bodyPr/>
           <a:lstStyle/>
           <a:p>
-            <a:fld id="{49788B37-C21A-5B49-AA3A-FF17C8E3A1E5}" type="datetimeFigureOut">
+            <a:fld id="{3DB1FFAF-60EF-440F-94DF-A30B7B8D6EFA}" type="datetime1">
               <a:rPr lang="en-US" smtClean="0"/>
               <a:t>5/3/2017</a:t>
             </a:fld>
@@ -1400,6 +1416,10 @@
           <a:bodyPr/>
           <a:lstStyle/>
           <a:p>
+            <a:r>
+              <a:rPr lang="en-US" smtClean="0"/>
+              <a:t>Michele Samorani - Data Science Analysis with Python</a:t>
+            </a:r>
             <a:endParaRPr lang="en-US"/>
           </a:p>
         </p:txBody>
@@ -1609,7 +1629,7 @@
           <a:bodyPr/>
           <a:lstStyle/>
           <a:p>
-            <a:fld id="{49788B37-C21A-5B49-AA3A-FF17C8E3A1E5}" type="datetimeFigureOut">
+            <a:fld id="{B54ACF4A-5994-4156-A7E6-3774C3D176B0}" type="datetime1">
               <a:rPr lang="en-US" smtClean="0"/>
               <a:t>5/3/2017</a:t>
             </a:fld>
@@ -1632,6 +1652,10 @@
           <a:bodyPr/>
           <a:lstStyle/>
           <a:p>
+            <a:r>
+              <a:rPr lang="en-US" smtClean="0"/>
+              <a:t>Michele Samorani - Data Science Analysis with Python</a:t>
+            </a:r>
             <a:endParaRPr lang="en-US"/>
           </a:p>
         </p:txBody>
@@ -1976,7 +2000,7 @@
           <a:bodyPr/>
           <a:lstStyle/>
           <a:p>
-            <a:fld id="{49788B37-C21A-5B49-AA3A-FF17C8E3A1E5}" type="datetimeFigureOut">
+            <a:fld id="{9BE3CC61-17FF-401E-9159-0078A6C162D0}" type="datetime1">
               <a:rPr lang="en-US" smtClean="0"/>
               <a:t>5/3/2017</a:t>
             </a:fld>
@@ -1999,6 +2023,10 @@
           <a:bodyPr/>
           <a:lstStyle/>
           <a:p>
+            <a:r>
+              <a:rPr lang="en-US" smtClean="0"/>
+              <a:t>Michele Samorani - Data Science Analysis with Python</a:t>
+            </a:r>
             <a:endParaRPr lang="en-US"/>
           </a:p>
         </p:txBody>
@@ -2094,7 +2122,7 @@
           <a:bodyPr/>
           <a:lstStyle/>
           <a:p>
-            <a:fld id="{49788B37-C21A-5B49-AA3A-FF17C8E3A1E5}" type="datetimeFigureOut">
+            <a:fld id="{CC6E792F-6329-4070-A993-EC3A97226EBA}" type="datetime1">
               <a:rPr lang="en-US" smtClean="0"/>
               <a:t>5/3/2017</a:t>
             </a:fld>
@@ -2117,6 +2145,10 @@
           <a:bodyPr/>
           <a:lstStyle/>
           <a:p>
+            <a:r>
+              <a:rPr lang="en-US" smtClean="0"/>
+              <a:t>Michele Samorani - Data Science Analysis with Python</a:t>
+            </a:r>
             <a:endParaRPr lang="en-US"/>
           </a:p>
         </p:txBody>
@@ -2189,7 +2221,7 @@
           <a:bodyPr/>
           <a:lstStyle/>
           <a:p>
-            <a:fld id="{49788B37-C21A-5B49-AA3A-FF17C8E3A1E5}" type="datetimeFigureOut">
+            <a:fld id="{F5012520-309D-41BD-AE93-FC2BAFEA95EC}" type="datetime1">
               <a:rPr lang="en-US" smtClean="0"/>
               <a:t>5/3/2017</a:t>
             </a:fld>
@@ -2212,6 +2244,10 @@
           <a:bodyPr/>
           <a:lstStyle/>
           <a:p>
+            <a:r>
+              <a:rPr lang="en-US" smtClean="0"/>
+              <a:t>Michele Samorani - Data Science Analysis with Python</a:t>
+            </a:r>
             <a:endParaRPr lang="en-US"/>
           </a:p>
         </p:txBody>
@@ -2466,7 +2502,7 @@
           <a:bodyPr/>
           <a:lstStyle/>
           <a:p>
-            <a:fld id="{49788B37-C21A-5B49-AA3A-FF17C8E3A1E5}" type="datetimeFigureOut">
+            <a:fld id="{560E7DB7-8132-4077-A9BF-B3D38366B521}" type="datetime1">
               <a:rPr lang="en-US" smtClean="0"/>
               <a:t>5/3/2017</a:t>
             </a:fld>
@@ -2489,6 +2525,10 @@
           <a:bodyPr/>
           <a:lstStyle/>
           <a:p>
+            <a:r>
+              <a:rPr lang="en-US" smtClean="0"/>
+              <a:t>Michele Samorani - Data Science Analysis with Python</a:t>
+            </a:r>
             <a:endParaRPr lang="en-US"/>
           </a:p>
         </p:txBody>
@@ -2719,7 +2759,7 @@
           <a:bodyPr/>
           <a:lstStyle/>
           <a:p>
-            <a:fld id="{49788B37-C21A-5B49-AA3A-FF17C8E3A1E5}" type="datetimeFigureOut">
+            <a:fld id="{BCA6B345-787B-42D6-80C7-F5420B077FD9}" type="datetime1">
               <a:rPr lang="en-US" smtClean="0"/>
               <a:t>5/3/2017</a:t>
             </a:fld>
@@ -2742,6 +2782,10 @@
           <a:bodyPr/>
           <a:lstStyle/>
           <a:p>
+            <a:r>
+              <a:rPr lang="en-US" smtClean="0"/>
+              <a:t>Michele Samorani - Data Science Analysis with Python</a:t>
+            </a:r>
             <a:endParaRPr lang="en-US"/>
           </a:p>
         </p:txBody>
@@ -2932,7 +2976,7 @@
             </a:lvl1pPr>
           </a:lstStyle>
           <a:p>
-            <a:fld id="{49788B37-C21A-5B49-AA3A-FF17C8E3A1E5}" type="datetimeFigureOut">
+            <a:fld id="{AC59332E-FDF2-41F7-A4EA-BAB52BB488EB}" type="datetime1">
               <a:rPr lang="en-US" smtClean="0"/>
               <a:t>5/3/2017</a:t>
             </a:fld>
@@ -2973,6 +3017,10 @@
             </a:lvl1pPr>
           </a:lstStyle>
           <a:p>
+            <a:r>
+              <a:rPr lang="en-US" smtClean="0"/>
+              <a:t>Michele Samorani - Data Science Analysis with Python</a:t>
+            </a:r>
             <a:endParaRPr lang="en-US"/>
           </a:p>
         </p:txBody>
@@ -3039,6 +3087,7 @@
     <p:sldLayoutId id="2147483658" r:id="rId10"/>
     <p:sldLayoutId id="2147483659" r:id="rId11"/>
   </p:sldLayoutIdLst>
+  <p:hf sldNum="0" hdr="0" dt="0"/>
   <p:txStyles>
     <p:titleStyle>
       <a:lvl1pPr algn="l" defTabSz="914400" rtl="0" eaLnBrk="1" latinLnBrk="0" hangingPunct="1">
@@ -3376,7 +3425,129 @@
       </p:sp>
       <p:sp>
         <p:nvSpPr>
-          <p:cNvPr id="3" name="Subtitle 2"/>
+          <p:cNvPr id="4" name="TextBox 3"/>
+          <p:cNvSpPr txBox="1"/>
+          <p:nvPr/>
+        </p:nvSpPr>
+        <p:spPr>
+          <a:xfrm>
+            <a:off x="8093292" y="318052"/>
+            <a:ext cx="3720076" cy="1815882"/>
+          </a:xfrm>
+          <a:prstGeom prst="rect">
+            <a:avLst/>
+          </a:prstGeom>
+          <a:noFill/>
+          <a:ln>
+            <a:solidFill>
+              <a:schemeClr val="tx1"/>
+            </a:solidFill>
+          </a:ln>
+        </p:spPr>
+        <p:txBody>
+          <a:bodyPr wrap="square" rtlCol="0">
+            <a:spAutoFit/>
+          </a:bodyPr>
+          <a:lstStyle/>
+          <a:p>
+            <a:r>
+              <a:rPr lang="en-US" sz="1400" dirty="0"/>
+              <a:t>Note to other teachers and users of these slides</a:t>
+            </a:r>
+            <a:r>
+              <a:rPr lang="en-US" sz="1400" dirty="0" smtClean="0"/>
+              <a:t>. Feel free to </a:t>
+            </a:r>
+            <a:r>
+              <a:rPr lang="en-US" sz="1400" dirty="0"/>
+              <a:t>use </a:t>
+            </a:r>
+            <a:r>
+              <a:rPr lang="en-US" sz="1400" dirty="0" smtClean="0"/>
+              <a:t>or modify these </a:t>
+            </a:r>
+            <a:r>
+              <a:rPr lang="en-US" sz="1400" dirty="0"/>
+              <a:t>slides </a:t>
+            </a:r>
+            <a:r>
+              <a:rPr lang="en-US" sz="1400" dirty="0" smtClean="0"/>
+              <a:t>as you wish.  If </a:t>
+            </a:r>
+            <a:r>
+              <a:rPr lang="en-US" sz="1400" dirty="0"/>
+              <a:t>you </a:t>
+            </a:r>
+            <a:r>
+              <a:rPr lang="en-US" sz="1400" dirty="0" smtClean="0"/>
+              <a:t>use a </a:t>
+            </a:r>
+            <a:r>
+              <a:rPr lang="en-US" sz="1400" dirty="0"/>
+              <a:t>significant portion of these </a:t>
+            </a:r>
+            <a:r>
+              <a:rPr lang="en-US" sz="1400" dirty="0" smtClean="0"/>
+              <a:t>slides in </a:t>
+            </a:r>
+            <a:r>
+              <a:rPr lang="en-US" sz="1400" dirty="0"/>
+              <a:t>your own lecture, please include this message, </a:t>
+            </a:r>
+            <a:r>
+              <a:rPr lang="en-US" sz="1400" dirty="0" smtClean="0"/>
+              <a:t>or the </a:t>
+            </a:r>
+            <a:r>
+              <a:rPr lang="en-US" sz="1400" dirty="0"/>
+              <a:t>following link to the source repository </a:t>
+            </a:r>
+            <a:r>
+              <a:rPr lang="en-US" sz="1400" dirty="0" smtClean="0"/>
+              <a:t>of Michele’s lectures on </a:t>
+            </a:r>
+            <a:r>
+              <a:rPr lang="en-US" sz="1400" dirty="0" err="1" smtClean="0"/>
+              <a:t>github</a:t>
+            </a:r>
+            <a:r>
+              <a:rPr lang="en-US" sz="1400" dirty="0" smtClean="0"/>
+              <a:t>:</a:t>
+            </a:r>
+            <a:endParaRPr lang="en-US" sz="1400" dirty="0"/>
+          </a:p>
+          <a:p>
+            <a:r>
+              <a:rPr lang="en-US" sz="1400" dirty="0">
+                <a:hlinkClick r:id="rId2"/>
+              </a:rPr>
+              <a:t>https://</a:t>
+            </a:r>
+            <a:r>
+              <a:rPr lang="en-US" sz="1400" dirty="0" smtClean="0">
+                <a:hlinkClick r:id="rId2"/>
+              </a:rPr>
+              <a:t>github.com/samorani</a:t>
+            </a:r>
+            <a:r>
+              <a:rPr lang="en-US" sz="1400" dirty="0" smtClean="0"/>
+              <a:t>. Comments and </a:t>
+            </a:r>
+            <a:r>
+              <a:rPr lang="en-US" sz="1400" dirty="0"/>
+              <a:t>corrections </a:t>
+            </a:r>
+            <a:r>
+              <a:rPr lang="en-US" sz="1400" dirty="0" smtClean="0"/>
+              <a:t>are welcome.</a:t>
+            </a:r>
+            <a:endParaRPr lang="en-US" sz="1400" dirty="0"/>
+          </a:p>
+        </p:txBody>
+      </p:sp>
+      <p:sp>
+        <p:nvSpPr>
+          <p:cNvPr id="5" name="Subtitle 4"/>
           <p:cNvSpPr>
             <a:spLocks noGrp="1"/>
           </p:cNvSpPr>
@@ -3384,27 +3555,35 @@
             <p:ph type="subTitle" idx="1"/>
           </p:nvPr>
         </p:nvSpPr>
-        <p:spPr>
-          <a:xfrm>
-            <a:off x="1562277" y="4378183"/>
-            <a:ext cx="9144000" cy="1338943"/>
-          </a:xfrm>
-        </p:spPr>
-        <p:txBody>
-          <a:bodyPr>
-            <a:normAutofit/>
-          </a:bodyPr>
-          <a:lstStyle/>
-          <a:p>
-            <a:r>
-              <a:rPr lang="en-US" dirty="0" smtClean="0"/>
-              <a:t>Last update: </a:t>
-            </a:r>
-            <a:r>
-              <a:rPr lang="en-US" dirty="0" smtClean="0"/>
-              <a:t>5/3/2017</a:t>
-            </a:r>
-            <a:endParaRPr lang="en-US" dirty="0"/>
+        <p:spPr/>
+        <p:txBody>
+          <a:bodyPr/>
+          <a:lstStyle/>
+          <a:p>
+            <a:endParaRPr lang="en-US"/>
+          </a:p>
+        </p:txBody>
+      </p:sp>
+      <p:sp>
+        <p:nvSpPr>
+          <p:cNvPr id="6" name="Footer Placeholder 5"/>
+          <p:cNvSpPr>
+            <a:spLocks noGrp="1"/>
+          </p:cNvSpPr>
+          <p:nvPr>
+            <p:ph type="ftr" sz="quarter" idx="11"/>
+          </p:nvPr>
+        </p:nvSpPr>
+        <p:spPr/>
+        <p:txBody>
+          <a:bodyPr/>
+          <a:lstStyle/>
+          <a:p>
+            <a:r>
+              <a:rPr lang="en-US" smtClean="0"/>
+              <a:t>Michele Samorani - Data Science Analysis with Python</a:t>
+            </a:r>
+            <a:endParaRPr lang="en-US"/>
           </a:p>
         </p:txBody>
       </p:sp>
@@ -3676,6 +3855,29 @@
           </a:fontRef>
         </p:style>
       </p:cxnSp>
+      <p:sp>
+        <p:nvSpPr>
+          <p:cNvPr id="8" name="Footer Placeholder 7"/>
+          <p:cNvSpPr>
+            <a:spLocks noGrp="1"/>
+          </p:cNvSpPr>
+          <p:nvPr>
+            <p:ph type="ftr" sz="quarter" idx="11"/>
+          </p:nvPr>
+        </p:nvSpPr>
+        <p:spPr/>
+        <p:txBody>
+          <a:bodyPr/>
+          <a:lstStyle/>
+          <a:p>
+            <a:r>
+              <a:rPr lang="en-US" smtClean="0"/>
+              <a:t>Michele Samorani - Data Science Analysis with Python</a:t>
+            </a:r>
+            <a:endParaRPr lang="en-US"/>
+          </a:p>
+        </p:txBody>
+      </p:sp>
     </p:spTree>
     <p:extLst>
       <p:ext uri="{BB962C8B-B14F-4D97-AF65-F5344CB8AC3E}">
@@ -3936,11 +4138,7 @@
           <a:p>
             <a:r>
               <a:rPr lang="en-US" dirty="0" smtClean="0"/>
-              <a:t>“Faculty!” and “Business Man” </a:t>
-            </a:r>
-            <a:r>
-              <a:rPr lang="en-US" dirty="0" smtClean="0"/>
-              <a:t>from </a:t>
+              <a:t>“Faculty!” and “Business Man” from </a:t>
             </a:r>
             <a:r>
               <a:rPr lang="en-US" dirty="0" err="1" smtClean="0"/>
@@ -3948,11 +4146,7 @@
             </a:r>
             <a:r>
               <a:rPr lang="en-US" dirty="0" smtClean="0"/>
-              <a:t> and </a:t>
-            </a:r>
-            <a:r>
-              <a:rPr lang="en-US" dirty="0" smtClean="0"/>
-              <a:t>“Master of Hacking” from </a:t>
+              <a:t> and “Master of Hacking” from </a:t>
             </a:r>
             <a:r>
               <a:rPr lang="en-US" dirty="0" err="1" smtClean="0"/>
@@ -4106,6 +4300,29 @@
           </a:prstGeom>
         </p:spPr>
       </p:pic>
+      <p:sp>
+        <p:nvSpPr>
+          <p:cNvPr id="2" name="Footer Placeholder 1"/>
+          <p:cNvSpPr>
+            <a:spLocks noGrp="1"/>
+          </p:cNvSpPr>
+          <p:nvPr>
+            <p:ph type="ftr" sz="quarter" idx="11"/>
+          </p:nvPr>
+        </p:nvSpPr>
+        <p:spPr/>
+        <p:txBody>
+          <a:bodyPr/>
+          <a:lstStyle/>
+          <a:p>
+            <a:r>
+              <a:rPr lang="en-US" smtClean="0"/>
+              <a:t>Michele Samorani - Data Science Analysis with Python</a:t>
+            </a:r>
+            <a:endParaRPr lang="en-US"/>
+          </a:p>
+        </p:txBody>
+      </p:sp>
     </p:spTree>
     <p:extLst>
       <p:ext uri="{BB962C8B-B14F-4D97-AF65-F5344CB8AC3E}">
@@ -4353,23 +4570,7 @@
           <a:p>
             <a:r>
               <a:rPr lang="en-US" dirty="0" smtClean="0"/>
-              <a:t>“Faculty!” and “Business Man” are kept</a:t>
-            </a:r>
-            <a:r>
-              <a:rPr lang="en-US" dirty="0" smtClean="0"/>
-              <a:t>, </a:t>
-            </a:r>
-            <a:r>
-              <a:rPr lang="en-US" dirty="0" smtClean="0"/>
-              <a:t>“Master of Hacking” </a:t>
-            </a:r>
-            <a:r>
-              <a:rPr lang="en-US" dirty="0" smtClean="0"/>
-              <a:t>is </a:t>
-            </a:r>
-            <a:r>
-              <a:rPr lang="en-US" dirty="0" smtClean="0"/>
-              <a:t>not</a:t>
+              <a:t>“Faculty!” and “Business Man” are kept, “Master of Hacking” is not</a:t>
             </a:r>
           </a:p>
         </p:txBody>
@@ -4628,6 +4829,29 @@
           </a:prstGeom>
         </p:spPr>
       </p:pic>
+      <p:sp>
+        <p:nvSpPr>
+          <p:cNvPr id="5" name="Footer Placeholder 4"/>
+          <p:cNvSpPr>
+            <a:spLocks noGrp="1"/>
+          </p:cNvSpPr>
+          <p:nvPr>
+            <p:ph type="ftr" sz="quarter" idx="11"/>
+          </p:nvPr>
+        </p:nvSpPr>
+        <p:spPr/>
+        <p:txBody>
+          <a:bodyPr/>
+          <a:lstStyle/>
+          <a:p>
+            <a:r>
+              <a:rPr lang="en-US" smtClean="0"/>
+              <a:t>Michele Samorani - Data Science Analysis with Python</a:t>
+            </a:r>
+            <a:endParaRPr lang="en-US"/>
+          </a:p>
+        </p:txBody>
+      </p:sp>
     </p:spTree>
     <p:extLst>
       <p:ext uri="{BB962C8B-B14F-4D97-AF65-F5344CB8AC3E}">
@@ -5171,6 +5395,29 @@
           </a:p>
         </p:txBody>
       </p:sp>
+      <p:sp>
+        <p:nvSpPr>
+          <p:cNvPr id="2" name="Footer Placeholder 1"/>
+          <p:cNvSpPr>
+            <a:spLocks noGrp="1"/>
+          </p:cNvSpPr>
+          <p:nvPr>
+            <p:ph type="ftr" sz="quarter" idx="11"/>
+          </p:nvPr>
+        </p:nvSpPr>
+        <p:spPr/>
+        <p:txBody>
+          <a:bodyPr/>
+          <a:lstStyle/>
+          <a:p>
+            <a:r>
+              <a:rPr lang="en-US" smtClean="0"/>
+              <a:t>Michele Samorani - Data Science Analysis with Python</a:t>
+            </a:r>
+            <a:endParaRPr lang="en-US"/>
+          </a:p>
+        </p:txBody>
+      </p:sp>
     </p:spTree>
     <p:extLst>
       <p:ext uri="{BB962C8B-B14F-4D97-AF65-F5344CB8AC3E}">
@@ -5254,6 +5501,29 @@
           </a:p>
         </p:txBody>
       </p:sp>
+      <p:sp>
+        <p:nvSpPr>
+          <p:cNvPr id="4" name="Footer Placeholder 3"/>
+          <p:cNvSpPr>
+            <a:spLocks noGrp="1"/>
+          </p:cNvSpPr>
+          <p:nvPr>
+            <p:ph type="ftr" sz="quarter" idx="11"/>
+          </p:nvPr>
+        </p:nvSpPr>
+        <p:spPr/>
+        <p:txBody>
+          <a:bodyPr/>
+          <a:lstStyle/>
+          <a:p>
+            <a:r>
+              <a:rPr lang="en-US" smtClean="0"/>
+              <a:t>Michele Samorani - Data Science Analysis with Python</a:t>
+            </a:r>
+            <a:endParaRPr lang="en-US"/>
+          </a:p>
+        </p:txBody>
+      </p:sp>
     </p:spTree>
     <p:extLst>
       <p:ext uri="{BB962C8B-B14F-4D97-AF65-F5344CB8AC3E}">
@@ -5361,6 +5631,29 @@
           </a:p>
         </p:txBody>
       </p:sp>
+      <p:sp>
+        <p:nvSpPr>
+          <p:cNvPr id="3" name="Footer Placeholder 2"/>
+          <p:cNvSpPr>
+            <a:spLocks noGrp="1"/>
+          </p:cNvSpPr>
+          <p:nvPr>
+            <p:ph type="ftr" sz="quarter" idx="11"/>
+          </p:nvPr>
+        </p:nvSpPr>
+        <p:spPr/>
+        <p:txBody>
+          <a:bodyPr/>
+          <a:lstStyle/>
+          <a:p>
+            <a:r>
+              <a:rPr lang="en-US" smtClean="0"/>
+              <a:t>Michele Samorani - Data Science Analysis with Python</a:t>
+            </a:r>
+            <a:endParaRPr lang="en-US"/>
+          </a:p>
+        </p:txBody>
+      </p:sp>
     </p:spTree>
     <p:extLst>
       <p:ext uri="{BB962C8B-B14F-4D97-AF65-F5344CB8AC3E}">
@@ -5506,6 +5799,29 @@
           </a:prstGeom>
         </p:spPr>
       </p:pic>
+      <p:sp>
+        <p:nvSpPr>
+          <p:cNvPr id="4" name="Footer Placeholder 3"/>
+          <p:cNvSpPr>
+            <a:spLocks noGrp="1"/>
+          </p:cNvSpPr>
+          <p:nvPr>
+            <p:ph type="ftr" sz="quarter" idx="11"/>
+          </p:nvPr>
+        </p:nvSpPr>
+        <p:spPr/>
+        <p:txBody>
+          <a:bodyPr/>
+          <a:lstStyle/>
+          <a:p>
+            <a:r>
+              <a:rPr lang="en-US" smtClean="0"/>
+              <a:t>Michele Samorani - Data Science Analysis with Python</a:t>
+            </a:r>
+            <a:endParaRPr lang="en-US"/>
+          </a:p>
+        </p:txBody>
+      </p:sp>
     </p:spTree>
     <p:extLst>
       <p:ext uri="{BB962C8B-B14F-4D97-AF65-F5344CB8AC3E}">
@@ -5683,6 +5999,29 @@
           </a:p>
         </p:txBody>
       </p:sp>
+      <p:sp>
+        <p:nvSpPr>
+          <p:cNvPr id="2" name="Footer Placeholder 1"/>
+          <p:cNvSpPr>
+            <a:spLocks noGrp="1"/>
+          </p:cNvSpPr>
+          <p:nvPr>
+            <p:ph type="ftr" sz="quarter" idx="11"/>
+          </p:nvPr>
+        </p:nvSpPr>
+        <p:spPr/>
+        <p:txBody>
+          <a:bodyPr/>
+          <a:lstStyle/>
+          <a:p>
+            <a:r>
+              <a:rPr lang="en-US" smtClean="0"/>
+              <a:t>Michele Samorani - Data Science Analysis with Python</a:t>
+            </a:r>
+            <a:endParaRPr lang="en-US"/>
+          </a:p>
+        </p:txBody>
+      </p:sp>
     </p:spTree>
     <p:extLst>
       <p:ext uri="{BB962C8B-B14F-4D97-AF65-F5344CB8AC3E}">
@@ -5852,6 +6191,29 @@
               <a:buAutoNum type="arabicPeriod"/>
             </a:pPr>
             <a:endParaRPr lang="en-US" dirty="0"/>
+          </a:p>
+        </p:txBody>
+      </p:sp>
+      <p:sp>
+        <p:nvSpPr>
+          <p:cNvPr id="4" name="Footer Placeholder 3"/>
+          <p:cNvSpPr>
+            <a:spLocks noGrp="1"/>
+          </p:cNvSpPr>
+          <p:nvPr>
+            <p:ph type="ftr" sz="quarter" idx="11"/>
+          </p:nvPr>
+        </p:nvSpPr>
+        <p:spPr/>
+        <p:txBody>
+          <a:bodyPr/>
+          <a:lstStyle/>
+          <a:p>
+            <a:r>
+              <a:rPr lang="en-US" smtClean="0"/>
+              <a:t>Michele Samorani - Data Science Analysis with Python</a:t>
+            </a:r>
+            <a:endParaRPr lang="en-US"/>
           </a:p>
         </p:txBody>
       </p:sp>
@@ -5946,13 +6308,8 @@
           <a:p>
             <a:r>
               <a:rPr lang="en-US" dirty="0" smtClean="0"/>
-              <a:t>The midterm is on </a:t>
-            </a:r>
-            <a:r>
-              <a:rPr lang="en-US" dirty="0" smtClean="0"/>
-              <a:t>5/10</a:t>
-            </a:r>
-            <a:endParaRPr lang="en-US" dirty="0" smtClean="0"/>
+              <a:t>The midterm is on 5/10</a:t>
+            </a:r>
           </a:p>
           <a:p>
             <a:endParaRPr lang="en-US" dirty="0" smtClean="0"/>
@@ -5995,15 +6352,7 @@
             <a:pPr lvl="1"/>
             <a:r>
               <a:rPr lang="en-US" dirty="0" smtClean="0"/>
-              <a:t>Content covered: up to </a:t>
-            </a:r>
-            <a:r>
-              <a:rPr lang="en-US" dirty="0" smtClean="0"/>
-              <a:t>5/3 </a:t>
-            </a:r>
-            <a:r>
-              <a:rPr lang="en-US" dirty="0" smtClean="0"/>
-              <a:t>included</a:t>
+              <a:t>Content covered: up to 5/3 included</a:t>
             </a:r>
           </a:p>
           <a:p>
@@ -6030,16 +6379,31 @@
             <a:pPr lvl="1"/>
             <a:r>
               <a:rPr lang="en-US" dirty="0" smtClean="0"/>
-              <a:t>Content covered: up to </a:t>
-            </a:r>
-            <a:r>
-              <a:rPr lang="en-US" dirty="0" smtClean="0"/>
-              <a:t>5/7 </a:t>
-            </a:r>
-            <a:r>
-              <a:rPr lang="en-US" dirty="0" smtClean="0"/>
-              <a:t>included</a:t>
-            </a:r>
+              <a:t>Content covered: up to 5/7 included</a:t>
+            </a:r>
+          </a:p>
+        </p:txBody>
+      </p:sp>
+      <p:sp>
+        <p:nvSpPr>
+          <p:cNvPr id="4" name="Footer Placeholder 3"/>
+          <p:cNvSpPr>
+            <a:spLocks noGrp="1"/>
+          </p:cNvSpPr>
+          <p:nvPr>
+            <p:ph type="ftr" sz="quarter" idx="11"/>
+          </p:nvPr>
+        </p:nvSpPr>
+        <p:spPr/>
+        <p:txBody>
+          <a:bodyPr/>
+          <a:lstStyle/>
+          <a:p>
+            <a:r>
+              <a:rPr lang="en-US" smtClean="0"/>
+              <a:t>Michele Samorani - Data Science Analysis with Python</a:t>
+            </a:r>
+            <a:endParaRPr lang="en-US"/>
           </a:p>
         </p:txBody>
       </p:sp>
@@ -6245,6 +6609,29 @@
           </a:prstGeom>
         </p:spPr>
       </p:pic>
+      <p:sp>
+        <p:nvSpPr>
+          <p:cNvPr id="5" name="Footer Placeholder 4"/>
+          <p:cNvSpPr>
+            <a:spLocks noGrp="1"/>
+          </p:cNvSpPr>
+          <p:nvPr>
+            <p:ph type="ftr" sz="quarter" idx="11"/>
+          </p:nvPr>
+        </p:nvSpPr>
+        <p:spPr/>
+        <p:txBody>
+          <a:bodyPr/>
+          <a:lstStyle/>
+          <a:p>
+            <a:r>
+              <a:rPr lang="en-US" smtClean="0"/>
+              <a:t>Michele Samorani - Data Science Analysis with Python</a:t>
+            </a:r>
+            <a:endParaRPr lang="en-US"/>
+          </a:p>
+        </p:txBody>
+      </p:sp>
     </p:spTree>
     <p:extLst>
       <p:ext uri="{BB962C8B-B14F-4D97-AF65-F5344CB8AC3E}">
@@ -6327,6 +6714,29 @@
           </a:p>
         </p:txBody>
       </p:sp>
+      <p:sp>
+        <p:nvSpPr>
+          <p:cNvPr id="4" name="Footer Placeholder 3"/>
+          <p:cNvSpPr>
+            <a:spLocks noGrp="1"/>
+          </p:cNvSpPr>
+          <p:nvPr>
+            <p:ph type="ftr" sz="quarter" idx="11"/>
+          </p:nvPr>
+        </p:nvSpPr>
+        <p:spPr/>
+        <p:txBody>
+          <a:bodyPr/>
+          <a:lstStyle/>
+          <a:p>
+            <a:r>
+              <a:rPr lang="en-US" smtClean="0"/>
+              <a:t>Michele Samorani - Data Science Analysis with Python</a:t>
+            </a:r>
+            <a:endParaRPr lang="en-US"/>
+          </a:p>
+        </p:txBody>
+      </p:sp>
     </p:spTree>
     <p:extLst>
       <p:ext uri="{BB962C8B-B14F-4D97-AF65-F5344CB8AC3E}">
@@ -6410,6 +6820,29 @@
           </a:p>
         </p:txBody>
       </p:sp>
+      <p:sp>
+        <p:nvSpPr>
+          <p:cNvPr id="4" name="Footer Placeholder 3"/>
+          <p:cNvSpPr>
+            <a:spLocks noGrp="1"/>
+          </p:cNvSpPr>
+          <p:nvPr>
+            <p:ph type="ftr" sz="quarter" idx="11"/>
+          </p:nvPr>
+        </p:nvSpPr>
+        <p:spPr/>
+        <p:txBody>
+          <a:bodyPr/>
+          <a:lstStyle/>
+          <a:p>
+            <a:r>
+              <a:rPr lang="en-US" smtClean="0"/>
+              <a:t>Michele Samorani - Data Science Analysis with Python</a:t>
+            </a:r>
+            <a:endParaRPr lang="en-US"/>
+          </a:p>
+        </p:txBody>
+      </p:sp>
     </p:spTree>
     <p:extLst>
       <p:ext uri="{BB962C8B-B14F-4D97-AF65-F5344CB8AC3E}">
@@ -6517,6 +6950,29 @@
           </a:p>
         </p:txBody>
       </p:sp>
+      <p:sp>
+        <p:nvSpPr>
+          <p:cNvPr id="3" name="Footer Placeholder 2"/>
+          <p:cNvSpPr>
+            <a:spLocks noGrp="1"/>
+          </p:cNvSpPr>
+          <p:nvPr>
+            <p:ph type="ftr" sz="quarter" idx="11"/>
+          </p:nvPr>
+        </p:nvSpPr>
+        <p:spPr/>
+        <p:txBody>
+          <a:bodyPr/>
+          <a:lstStyle/>
+          <a:p>
+            <a:r>
+              <a:rPr lang="en-US" smtClean="0"/>
+              <a:t>Michele Samorani - Data Science Analysis with Python</a:t>
+            </a:r>
+            <a:endParaRPr lang="en-US"/>
+          </a:p>
+        </p:txBody>
+      </p:sp>
     </p:spTree>
     <p:extLst>
       <p:ext uri="{BB962C8B-B14F-4D97-AF65-F5344CB8AC3E}">
@@ -6691,6 +7147,29 @@
               <a:t>A fictitious program</a:t>
             </a:r>
             <a:endParaRPr lang="en-US" dirty="0"/>
+          </a:p>
+        </p:txBody>
+      </p:sp>
+      <p:sp>
+        <p:nvSpPr>
+          <p:cNvPr id="3" name="Footer Placeholder 2"/>
+          <p:cNvSpPr>
+            <a:spLocks noGrp="1"/>
+          </p:cNvSpPr>
+          <p:nvPr>
+            <p:ph type="ftr" sz="quarter" idx="11"/>
+          </p:nvPr>
+        </p:nvSpPr>
+        <p:spPr/>
+        <p:txBody>
+          <a:bodyPr/>
+          <a:lstStyle/>
+          <a:p>
+            <a:r>
+              <a:rPr lang="en-US" smtClean="0"/>
+              <a:t>Michele Samorani - Data Science Analysis with Python</a:t>
+            </a:r>
+            <a:endParaRPr lang="en-US"/>
           </a:p>
         </p:txBody>
       </p:sp>
@@ -7260,6 +7739,34 @@
               <a:t>Let’s show just few columns</a:t>
             </a:r>
             <a:endParaRPr lang="en-US" i="1" dirty="0"/>
+          </a:p>
+        </p:txBody>
+      </p:sp>
+      <p:sp>
+        <p:nvSpPr>
+          <p:cNvPr id="3" name="Footer Placeholder 2"/>
+          <p:cNvSpPr>
+            <a:spLocks noGrp="1"/>
+          </p:cNvSpPr>
+          <p:nvPr>
+            <p:ph type="ftr" sz="quarter" idx="11"/>
+          </p:nvPr>
+        </p:nvSpPr>
+        <p:spPr>
+          <a:xfrm>
+            <a:off x="4038600" y="6470802"/>
+            <a:ext cx="4114800" cy="365125"/>
+          </a:xfrm>
+        </p:spPr>
+        <p:txBody>
+          <a:bodyPr/>
+          <a:lstStyle/>
+          <a:p>
+            <a:r>
+              <a:rPr lang="en-US" smtClean="0"/>
+              <a:t>Michele Samorani - Data Science Analysis with Python</a:t>
+            </a:r>
+            <a:endParaRPr lang="en-US"/>
           </a:p>
         </p:txBody>
       </p:sp>

</xml_diff>